<commit_message>
updated search and settings
</commit_message>
<xml_diff>
--- a/NDIMAZ196_FTC2306_GroupA_NdiphiwokuhleMazeka_IWA_Presentation.pptx
+++ b/NDIMAZ196_FTC2306_GroupA_NdiphiwokuhleMazeka_IWA_Presentation.pptx
@@ -114,6 +114,11 @@
       </a:defRPr>
     </a:lvl9pPr>
   </p:defaultTextStyle>
+  <p:extLst>
+    <p:ext uri="{EFAFB233-063F-42B5-8137-9DF3F51BA10A}">
+      <p15:sldGuideLst xmlns:p15="http://schemas.microsoft.com/office/powerpoint/2012/main"/>
+    </p:ext>
+  </p:extLst>
 </p:presentation>
 </file>
 
@@ -303,7 +308,7 @@
           <a:p>
             <a:fld id="{D78C2A1B-08E5-4A54-B8C8-0A66A1EC32ED}" type="datetimeFigureOut">
               <a:rPr lang="en-ZA" smtClean="0"/>
-              <a:t>2023/09/08</a:t>
+              <a:t>2023/09/14</a:t>
             </a:fld>
             <a:endParaRPr lang="en-ZA"/>
           </a:p>
@@ -578,7 +583,7 @@
           <a:p>
             <a:fld id="{D78C2A1B-08E5-4A54-B8C8-0A66A1EC32ED}" type="datetimeFigureOut">
               <a:rPr lang="en-ZA" smtClean="0"/>
-              <a:t>2023/09/08</a:t>
+              <a:t>2023/09/14</a:t>
             </a:fld>
             <a:endParaRPr lang="en-ZA"/>
           </a:p>
@@ -772,7 +777,7 @@
           <a:p>
             <a:fld id="{D78C2A1B-08E5-4A54-B8C8-0A66A1EC32ED}" type="datetimeFigureOut">
               <a:rPr lang="en-ZA" smtClean="0"/>
-              <a:t>2023/09/08</a:t>
+              <a:t>2023/09/14</a:t>
             </a:fld>
             <a:endParaRPr lang="en-ZA"/>
           </a:p>
@@ -1045,7 +1050,7 @@
           <a:p>
             <a:fld id="{D78C2A1B-08E5-4A54-B8C8-0A66A1EC32ED}" type="datetimeFigureOut">
               <a:rPr lang="en-ZA" smtClean="0"/>
-              <a:t>2023/09/08</a:t>
+              <a:t>2023/09/14</a:t>
             </a:fld>
             <a:endParaRPr lang="en-ZA"/>
           </a:p>
@@ -1386,7 +1391,7 @@
           <a:p>
             <a:fld id="{D78C2A1B-08E5-4A54-B8C8-0A66A1EC32ED}" type="datetimeFigureOut">
               <a:rPr lang="en-ZA" smtClean="0"/>
-              <a:t>2023/09/08</a:t>
+              <a:t>2023/09/14</a:t>
             </a:fld>
             <a:endParaRPr lang="en-ZA"/>
           </a:p>
@@ -2009,7 +2014,7 @@
           <a:p>
             <a:fld id="{D78C2A1B-08E5-4A54-B8C8-0A66A1EC32ED}" type="datetimeFigureOut">
               <a:rPr lang="en-ZA" smtClean="0"/>
-              <a:t>2023/09/08</a:t>
+              <a:t>2023/09/14</a:t>
             </a:fld>
             <a:endParaRPr lang="en-ZA"/>
           </a:p>
@@ -2869,7 +2874,7 @@
           <a:p>
             <a:fld id="{D78C2A1B-08E5-4A54-B8C8-0A66A1EC32ED}" type="datetimeFigureOut">
               <a:rPr lang="en-ZA" smtClean="0"/>
-              <a:t>2023/09/08</a:t>
+              <a:t>2023/09/14</a:t>
             </a:fld>
             <a:endParaRPr lang="en-ZA"/>
           </a:p>
@@ -3039,7 +3044,7 @@
           <a:p>
             <a:fld id="{D78C2A1B-08E5-4A54-B8C8-0A66A1EC32ED}" type="datetimeFigureOut">
               <a:rPr lang="en-ZA" smtClean="0"/>
-              <a:t>2023/09/08</a:t>
+              <a:t>2023/09/14</a:t>
             </a:fld>
             <a:endParaRPr lang="en-ZA"/>
           </a:p>
@@ -3219,7 +3224,7 @@
           <a:p>
             <a:fld id="{D78C2A1B-08E5-4A54-B8C8-0A66A1EC32ED}" type="datetimeFigureOut">
               <a:rPr lang="en-ZA" smtClean="0"/>
-              <a:t>2023/09/08</a:t>
+              <a:t>2023/09/14</a:t>
             </a:fld>
             <a:endParaRPr lang="en-ZA"/>
           </a:p>
@@ -3389,7 +3394,7 @@
           <a:p>
             <a:fld id="{D78C2A1B-08E5-4A54-B8C8-0A66A1EC32ED}" type="datetimeFigureOut">
               <a:rPr lang="en-ZA" smtClean="0"/>
-              <a:t>2023/09/08</a:t>
+              <a:t>2023/09/14</a:t>
             </a:fld>
             <a:endParaRPr lang="en-ZA"/>
           </a:p>
@@ -3636,7 +3641,7 @@
           <a:p>
             <a:fld id="{D78C2A1B-08E5-4A54-B8C8-0A66A1EC32ED}" type="datetimeFigureOut">
               <a:rPr lang="en-ZA" smtClean="0"/>
-              <a:t>2023/09/08</a:t>
+              <a:t>2023/09/14</a:t>
             </a:fld>
             <a:endParaRPr lang="en-ZA"/>
           </a:p>
@@ -3928,7 +3933,7 @@
           <a:p>
             <a:fld id="{D78C2A1B-08E5-4A54-B8C8-0A66A1EC32ED}" type="datetimeFigureOut">
               <a:rPr lang="en-ZA" smtClean="0"/>
-              <a:t>2023/09/08</a:t>
+              <a:t>2023/09/14</a:t>
             </a:fld>
             <a:endParaRPr lang="en-ZA"/>
           </a:p>
@@ -4372,7 +4377,7 @@
           <a:p>
             <a:fld id="{D78C2A1B-08E5-4A54-B8C8-0A66A1EC32ED}" type="datetimeFigureOut">
               <a:rPr lang="en-ZA" smtClean="0"/>
-              <a:t>2023/09/08</a:t>
+              <a:t>2023/09/14</a:t>
             </a:fld>
             <a:endParaRPr lang="en-ZA"/>
           </a:p>
@@ -4490,7 +4495,7 @@
           <a:p>
             <a:fld id="{D78C2A1B-08E5-4A54-B8C8-0A66A1EC32ED}" type="datetimeFigureOut">
               <a:rPr lang="en-ZA" smtClean="0"/>
-              <a:t>2023/09/08</a:t>
+              <a:t>2023/09/14</a:t>
             </a:fld>
             <a:endParaRPr lang="en-ZA"/>
           </a:p>
@@ -4585,7 +4590,7 @@
           <a:p>
             <a:fld id="{D78C2A1B-08E5-4A54-B8C8-0A66A1EC32ED}" type="datetimeFigureOut">
               <a:rPr lang="en-ZA" smtClean="0"/>
-              <a:t>2023/09/08</a:t>
+              <a:t>2023/09/14</a:t>
             </a:fld>
             <a:endParaRPr lang="en-ZA"/>
           </a:p>
@@ -4864,7 +4869,7 @@
           <a:p>
             <a:fld id="{D78C2A1B-08E5-4A54-B8C8-0A66A1EC32ED}" type="datetimeFigureOut">
               <a:rPr lang="en-ZA" smtClean="0"/>
-              <a:t>2023/09/08</a:t>
+              <a:t>2023/09/14</a:t>
             </a:fld>
             <a:endParaRPr lang="en-ZA"/>
           </a:p>
@@ -5139,7 +5144,7 @@
           <a:p>
             <a:fld id="{D78C2A1B-08E5-4A54-B8C8-0A66A1EC32ED}" type="datetimeFigureOut">
               <a:rPr lang="en-ZA" smtClean="0"/>
-              <a:t>2023/09/08</a:t>
+              <a:t>2023/09/14</a:t>
             </a:fld>
             <a:endParaRPr lang="en-ZA"/>
           </a:p>
@@ -5568,7 +5573,7 @@
           <a:p>
             <a:fld id="{D78C2A1B-08E5-4A54-B8C8-0A66A1EC32ED}" type="datetimeFigureOut">
               <a:rPr lang="en-ZA" smtClean="0"/>
-              <a:t>2023/09/08</a:t>
+              <a:t>2023/09/14</a:t>
             </a:fld>
             <a:endParaRPr lang="en-ZA"/>
           </a:p>
@@ -6733,8 +6738,8 @@
         </p:blipFill>
         <p:spPr>
           <a:xfrm>
-            <a:off x="1106647" y="1585518"/>
-            <a:ext cx="10515600" cy="2205471"/>
+            <a:off x="411061" y="1770076"/>
+            <a:ext cx="11134828" cy="2030137"/>
           </a:xfrm>
         </p:spPr>
       </p:pic>
@@ -6752,7 +6757,7 @@
         </p:nvSpPr>
         <p:spPr>
           <a:xfrm>
-            <a:off x="2365695" y="4186106"/>
+            <a:off x="2341926" y="4186106"/>
             <a:ext cx="7508147" cy="1477328"/>
           </a:xfrm>
           <a:prstGeom prst="rect">
@@ -7214,19 +7219,17 @@
       </p:sp>
       <p:pic>
         <p:nvPicPr>
-          <p:cNvPr id="5" name="Content Placeholder 4">
+          <p:cNvPr id="7" name="Picture 6">
             <a:extLst>
               <a:ext uri="{FF2B5EF4-FFF2-40B4-BE49-F238E27FC236}">
-                <a16:creationId xmlns:a16="http://schemas.microsoft.com/office/drawing/2014/main" id="{856B885F-75D5-4A29-874F-54C6AD30A174}"/>
+                <a16:creationId xmlns:a16="http://schemas.microsoft.com/office/drawing/2014/main" id="{C27C17F2-1045-43E6-8C3D-AE546EF0B4D6}"/>
               </a:ext>
             </a:extLst>
           </p:cNvPr>
           <p:cNvPicPr>
-            <a:picLocks noGrp="1" noChangeAspect="1"/>
+            <a:picLocks noChangeAspect="1"/>
           </p:cNvPicPr>
-          <p:nvPr>
-            <p:ph idx="1"/>
-          </p:nvPr>
+          <p:nvPr/>
         </p:nvPicPr>
         <p:blipFill>
           <a:blip r:embed="rId2">
@@ -7242,24 +7245,29 @@
         </p:blipFill>
         <p:spPr>
           <a:xfrm>
-            <a:off x="313909" y="1919440"/>
-            <a:ext cx="5387807" cy="2218582"/>
-          </a:xfrm>
+            <a:off x="1824605" y="2126915"/>
+            <a:ext cx="9717248" cy="4542332"/>
+          </a:xfrm>
+          <a:prstGeom prst="rect">
+            <a:avLst/>
+          </a:prstGeom>
         </p:spPr>
       </p:pic>
       <p:pic>
         <p:nvPicPr>
-          <p:cNvPr id="7" name="Picture 6">
+          <p:cNvPr id="5" name="Content Placeholder 4">
             <a:extLst>
               <a:ext uri="{FF2B5EF4-FFF2-40B4-BE49-F238E27FC236}">
-                <a16:creationId xmlns:a16="http://schemas.microsoft.com/office/drawing/2014/main" id="{C27C17F2-1045-43E6-8C3D-AE546EF0B4D6}"/>
+                <a16:creationId xmlns:a16="http://schemas.microsoft.com/office/drawing/2014/main" id="{856B885F-75D5-4A29-874F-54C6AD30A174}"/>
               </a:ext>
             </a:extLst>
           </p:cNvPr>
           <p:cNvPicPr>
-            <a:picLocks noChangeAspect="1"/>
+            <a:picLocks noGrp="1" noChangeAspect="1"/>
           </p:cNvPicPr>
-          <p:nvPr/>
+          <p:nvPr>
+            <p:ph idx="1"/>
+          </p:nvPr>
         </p:nvPicPr>
         <p:blipFill>
           <a:blip r:embed="rId3">
@@ -7275,12 +7283,9 @@
         </p:blipFill>
         <p:spPr>
           <a:xfrm>
-            <a:off x="1824605" y="2126915"/>
-            <a:ext cx="9717248" cy="4542332"/>
-          </a:xfrm>
-          <a:prstGeom prst="rect">
-            <a:avLst/>
-          </a:prstGeom>
+            <a:off x="313909" y="1919440"/>
+            <a:ext cx="5387807" cy="2218582"/>
+          </a:xfrm>
         </p:spPr>
       </p:pic>
     </p:spTree>
@@ -7512,19 +7517,17 @@
       </p:sp>
       <p:pic>
         <p:nvPicPr>
-          <p:cNvPr id="5" name="Content Placeholder 4">
+          <p:cNvPr id="7" name="Picture 6">
             <a:extLst>
               <a:ext uri="{FF2B5EF4-FFF2-40B4-BE49-F238E27FC236}">
-                <a16:creationId xmlns:a16="http://schemas.microsoft.com/office/drawing/2014/main" id="{289753C3-D55F-45F5-8554-001DC76182B3}"/>
+                <a16:creationId xmlns:a16="http://schemas.microsoft.com/office/drawing/2014/main" id="{1CA8951A-52D2-4396-9CF3-9C09126F4123}"/>
               </a:ext>
             </a:extLst>
           </p:cNvPr>
           <p:cNvPicPr>
-            <a:picLocks noGrp="1" noChangeAspect="1"/>
+            <a:picLocks noChangeAspect="1"/>
           </p:cNvPicPr>
-          <p:nvPr>
-            <p:ph idx="1"/>
-          </p:nvPr>
+          <p:nvPr/>
         </p:nvPicPr>
         <p:blipFill>
           <a:blip r:embed="rId2">
@@ -7540,24 +7543,29 @@
         </p:blipFill>
         <p:spPr>
           <a:xfrm>
-            <a:off x="0" y="1690688"/>
-            <a:ext cx="5169308" cy="4351338"/>
-          </a:xfrm>
+            <a:off x="1303089" y="1969135"/>
+            <a:ext cx="10888911" cy="4691724"/>
+          </a:xfrm>
+          <a:prstGeom prst="rect">
+            <a:avLst/>
+          </a:prstGeom>
         </p:spPr>
       </p:pic>
       <p:pic>
         <p:nvPicPr>
-          <p:cNvPr id="7" name="Picture 6">
+          <p:cNvPr id="5" name="Content Placeholder 4">
             <a:extLst>
               <a:ext uri="{FF2B5EF4-FFF2-40B4-BE49-F238E27FC236}">
-                <a16:creationId xmlns:a16="http://schemas.microsoft.com/office/drawing/2014/main" id="{1CA8951A-52D2-4396-9CF3-9C09126F4123}"/>
+                <a16:creationId xmlns:a16="http://schemas.microsoft.com/office/drawing/2014/main" id="{289753C3-D55F-45F5-8554-001DC76182B3}"/>
               </a:ext>
             </a:extLst>
           </p:cNvPr>
           <p:cNvPicPr>
-            <a:picLocks noChangeAspect="1"/>
+            <a:picLocks noGrp="1" noChangeAspect="1"/>
           </p:cNvPicPr>
-          <p:nvPr/>
+          <p:nvPr>
+            <p:ph idx="1"/>
+          </p:nvPr>
         </p:nvPicPr>
         <p:blipFill>
           <a:blip r:embed="rId3">
@@ -7573,12 +7581,9 @@
         </p:blipFill>
         <p:spPr>
           <a:xfrm>
-            <a:off x="1303089" y="1969135"/>
-            <a:ext cx="10888911" cy="4691724"/>
-          </a:xfrm>
-          <a:prstGeom prst="rect">
-            <a:avLst/>
-          </a:prstGeom>
+            <a:off x="0" y="1690688"/>
+            <a:ext cx="5169308" cy="4351338"/>
+          </a:xfrm>
         </p:spPr>
       </p:pic>
     </p:spTree>

</xml_diff>